<commit_message>
updated scripts and spelling correction
</commit_message>
<xml_diff>
--- a/Workshop_Materials/Workshop_18-Performant_Programming.pptx
+++ b/Workshop_Materials/Workshop_18-Performant_Programming.pptx
@@ -3091,15 +3091,23 @@
                   <a:srgbClr val="999999"/>
                 </a:solidFill>
               </a:rPr>
-              <a:t>Sparse data </a:t>
-            </a:r>
-            <a:r>
-              <a:rPr lang="en-US" sz="2800" dirty="0" err="1" smtClean="0">
+              <a:t>Sparse </a:t>
+            </a:r>
+            <a:r>
+              <a:rPr lang="en-US" sz="2800" smtClean="0">
                 <a:solidFill>
                   <a:srgbClr val="999999"/>
                 </a:solidFill>
               </a:rPr>
-              <a:t>sctructures</a:t>
+              <a:t>data </a:t>
+            </a:r>
+            <a:r>
+              <a:rPr lang="en-US" sz="2800" smtClean="0">
+                <a:solidFill>
+                  <a:srgbClr val="999999"/>
+                </a:solidFill>
+              </a:rPr>
+              <a:t>structures</a:t>
             </a:r>
             <a:endParaRPr lang="en-US" sz="2800" dirty="0" smtClean="0">
               <a:solidFill>

</xml_diff>